<commit_message>
updating assignment #4 presentation for the night.
</commit_message>
<xml_diff>
--- a/Assignment #4 - iOS Prototype/CS235 - Assignment #4 - Mobile Prototype.pptx
+++ b/Assignment #4 - iOS Prototype/CS235 - Assignment #4 - Mobile Prototype.pptx
@@ -3546,22 +3546,13 @@
           <a:p>
             <a:pPr lvl="2"/>
             <a:r>
-              <a:rPr lang="en-US" dirty="0" smtClean="0"/>
-              <a:t>Mobile friendly version of day</a:t>
-            </a:r>
-            <a:r>
-              <a:rPr lang="en-US" dirty="0" smtClean="0"/>
-              <a:t>, week, and month calendar </a:t>
-            </a:r>
-            <a:r>
-              <a:rPr lang="en-US" dirty="0" smtClean="0"/>
-              <a:t>views</a:t>
-            </a:r>
-            <a:endParaRPr lang="en-US" sz="2000" b="1" dirty="0" smtClean="0">
-              <a:solidFill>
-                <a:srgbClr val="003300"/>
-              </a:solidFill>
-            </a:endParaRPr>
+              <a:rPr lang="en-US" sz="1800" dirty="0" smtClean="0">
+                <a:solidFill>
+                  <a:srgbClr val="003300"/>
+                </a:solidFill>
+              </a:rPr>
+              <a:t>Mobile friendly version of day, week, and month calendar views</a:t>
+            </a:r>
           </a:p>
           <a:p>
             <a:pPr lvl="1">
@@ -3829,9 +3820,17 @@
             </a:r>
           </a:p>
           <a:p>
-            <a:pPr lvl="2"/>
-            <a:r>
-              <a:rPr lang="en-US" dirty="0" smtClean="0"/>
+            <a:pPr lvl="2">
+              <a:lnSpc>
+                <a:spcPct val="90000"/>
+              </a:lnSpc>
+            </a:pPr>
+            <a:r>
+              <a:rPr lang="en-US" sz="1800" dirty="0" smtClean="0">
+                <a:solidFill>
+                  <a:srgbClr val="003300"/>
+                </a:solidFill>
+              </a:rPr>
               <a:t>Motion and coloring of errors</a:t>
             </a:r>
           </a:p>
@@ -3847,9 +3846,17 @@
             </a:r>
           </a:p>
           <a:p>
-            <a:pPr lvl="2"/>
-            <a:r>
-              <a:rPr lang="en-US" dirty="0" smtClean="0"/>
+            <a:pPr lvl="2">
+              <a:lnSpc>
+                <a:spcPct val="90000"/>
+              </a:lnSpc>
+            </a:pPr>
+            <a:r>
+              <a:rPr lang="en-US" sz="1800" dirty="0" smtClean="0">
+                <a:solidFill>
+                  <a:srgbClr val="003300"/>
+                </a:solidFill>
+              </a:rPr>
               <a:t>Mobile friendly</a:t>
             </a:r>
           </a:p>
@@ -3873,12 +3880,19 @@
             </a:r>
           </a:p>
           <a:p>
-            <a:pPr lvl="2"/>
-            <a:r>
-              <a:rPr lang="en-US" dirty="0" smtClean="0"/>
+            <a:pPr lvl="2">
+              <a:lnSpc>
+                <a:spcPct val="90000"/>
+              </a:lnSpc>
+            </a:pPr>
+            <a:r>
+              <a:rPr lang="en-US" sz="1800" dirty="0" smtClean="0">
+                <a:solidFill>
+                  <a:srgbClr val="003300"/>
+                </a:solidFill>
+              </a:rPr>
               <a:t>Calendar navigation</a:t>
             </a:r>
-            <a:endParaRPr lang="en-US" dirty="0" smtClean="0"/>
           </a:p>
           <a:p>
             <a:pPr lvl="1"/>
@@ -3892,9 +3906,13 @@
             </a:r>
           </a:p>
           <a:p>
-            <a:pPr lvl="2"/>
-            <a:r>
-              <a:rPr lang="en-US" dirty="0" smtClean="0">
+            <a:pPr lvl="2">
+              <a:lnSpc>
+                <a:spcPct val="90000"/>
+              </a:lnSpc>
+            </a:pPr>
+            <a:r>
+              <a:rPr lang="en-US" sz="1800" dirty="0" smtClean="0">
                 <a:solidFill>
                   <a:srgbClr val="003300"/>
                 </a:solidFill>
@@ -3902,7 +3920,7 @@
               <a:t>Don’t make ‘</a:t>
             </a:r>
             <a:r>
-              <a:rPr lang="en-US" dirty="0" err="1" smtClean="0">
+              <a:rPr lang="en-US" sz="1800" dirty="0" err="1" smtClean="0">
                 <a:solidFill>
                   <a:srgbClr val="003300"/>
                 </a:solidFill>
@@ -3910,7 +3928,7 @@
               <a:t>em</a:t>
             </a:r>
             <a:r>
-              <a:rPr lang="en-US" dirty="0" smtClean="0">
+              <a:rPr lang="en-US" sz="1800" dirty="0" smtClean="0">
                 <a:solidFill>
                   <a:srgbClr val="003300"/>
                 </a:solidFill>

</xml_diff>

<commit_message>
Uploading mobile prototype slides.
</commit_message>
<xml_diff>
--- a/Assignment #4 - iOS Prototype/CS235 - Assignment #4 - Mobile Prototype.pptx
+++ b/Assignment #4 - iOS Prototype/CS235 - Assignment #4 - Mobile Prototype.pptx
@@ -659,7 +659,9 @@
           </a:bodyPr>
           <a:lstStyle>
             <a:lvl1pPr>
-              <a:defRPr/>
+              <a:defRPr>
+                <a:latin typeface="+mj-lt"/>
+              </a:defRPr>
             </a:lvl1pPr>
           </a:lstStyle>
           <a:p>
@@ -698,6 +700,7 @@
                 <a:solidFill>
                   <a:schemeClr val="hlink"/>
                 </a:solidFill>
+                <a:latin typeface="+mj-lt"/>
               </a:defRPr>
             </a:lvl1pPr>
           </a:lstStyle>
@@ -740,7 +743,7 @@
                 <a:solidFill>
                   <a:srgbClr val="898989"/>
                 </a:solidFill>
-                <a:latin typeface="+mn-lt"/>
+                <a:latin typeface="+mj-lt"/>
               </a:defRPr>
             </a:lvl1pPr>
           </a:lstStyle>
@@ -772,7 +775,9 @@
           <a:bodyPr/>
           <a:lstStyle>
             <a:lvl1pPr>
-              <a:defRPr/>
+              <a:defRPr>
+                <a:latin typeface="+mj-lt"/>
+              </a:defRPr>
             </a:lvl1pPr>
           </a:lstStyle>
           <a:p>
@@ -807,6 +812,7 @@
                 <a:solidFill>
                   <a:srgbClr val="898989"/>
                 </a:solidFill>
+                <a:latin typeface="+mj-lt"/>
               </a:defRPr>
             </a:lvl1pPr>
           </a:lstStyle>
@@ -815,7 +821,7 @@
               <a:defRPr/>
             </a:pPr>
             <a:fld id="{D5A23C53-705A-491F-A9B6-108B336645CC}" type="slidenum">
-              <a:rPr lang="en-US"/>
+              <a:rPr lang="en-US" smtClean="0"/>
               <a:pPr>
                 <a:defRPr/>
               </a:pPr>
@@ -1302,8 +1308,8 @@
         </p:nvSpPr>
         <p:spPr>
           <a:xfrm>
-            <a:off x="457200" y="274638"/>
-            <a:ext cx="8229600" cy="1143000"/>
+            <a:off x="2171700" y="63500"/>
+            <a:ext cx="6896100" cy="622300"/>
           </a:xfrm>
         </p:spPr>
         <p:txBody>
@@ -1334,7 +1340,7 @@
         </p:nvSpPr>
         <p:spPr>
           <a:xfrm>
-            <a:off x="457200" y="1535113"/>
+            <a:off x="457200" y="963613"/>
             <a:ext cx="4040188" cy="639762"/>
           </a:xfrm>
         </p:spPr>
@@ -1381,7 +1387,7 @@
           <a:p>
             <a:pPr lvl="0"/>
             <a:r>
-              <a:rPr lang="en-US" smtClean="0"/>
+              <a:rPr lang="en-US" dirty="0" smtClean="0"/>
               <a:t>Click to edit Master text styles</a:t>
             </a:r>
           </a:p>
@@ -1399,8 +1405,8 @@
         </p:nvSpPr>
         <p:spPr>
           <a:xfrm>
-            <a:off x="457200" y="2174875"/>
-            <a:ext cx="4040188" cy="3951288"/>
+            <a:off x="457200" y="1603374"/>
+            <a:ext cx="4040188" cy="4429125"/>
           </a:xfrm>
         </p:spPr>
         <p:txBody>
@@ -1437,38 +1443,38 @@
           <a:p>
             <a:pPr lvl="0"/>
             <a:r>
-              <a:rPr lang="en-US" smtClean="0"/>
+              <a:rPr lang="en-US" dirty="0" smtClean="0"/>
               <a:t>Click to edit Master text styles</a:t>
             </a:r>
           </a:p>
           <a:p>
             <a:pPr lvl="1"/>
             <a:r>
-              <a:rPr lang="en-US" smtClean="0"/>
+              <a:rPr lang="en-US" dirty="0" smtClean="0"/>
               <a:t>Second level</a:t>
             </a:r>
           </a:p>
           <a:p>
             <a:pPr lvl="2"/>
             <a:r>
-              <a:rPr lang="en-US" smtClean="0"/>
+              <a:rPr lang="en-US" dirty="0" smtClean="0"/>
               <a:t>Third level</a:t>
             </a:r>
           </a:p>
           <a:p>
             <a:pPr lvl="3"/>
             <a:r>
-              <a:rPr lang="en-US" smtClean="0"/>
+              <a:rPr lang="en-US" dirty="0" smtClean="0"/>
               <a:t>Fourth level</a:t>
             </a:r>
           </a:p>
           <a:p>
             <a:pPr lvl="4"/>
             <a:r>
-              <a:rPr lang="en-US" smtClean="0"/>
+              <a:rPr lang="en-US" dirty="0" smtClean="0"/>
               <a:t>Fifth level</a:t>
             </a:r>
-            <a:endParaRPr lang="en-US"/>
+            <a:endParaRPr lang="en-US" dirty="0"/>
           </a:p>
         </p:txBody>
       </p:sp>
@@ -1484,7 +1490,7 @@
         </p:nvSpPr>
         <p:spPr>
           <a:xfrm>
-            <a:off x="4645025" y="1535113"/>
+            <a:off x="4645025" y="963613"/>
             <a:ext cx="4041775" cy="639762"/>
           </a:xfrm>
         </p:spPr>
@@ -1549,8 +1555,8 @@
         </p:nvSpPr>
         <p:spPr>
           <a:xfrm>
-            <a:off x="4645025" y="2174875"/>
-            <a:ext cx="4041775" cy="3951288"/>
+            <a:off x="4645025" y="1603374"/>
+            <a:ext cx="4041775" cy="4429125"/>
           </a:xfrm>
         </p:spPr>
         <p:txBody>
@@ -1587,38 +1593,38 @@
           <a:p>
             <a:pPr lvl="0"/>
             <a:r>
-              <a:rPr lang="en-US" smtClean="0"/>
+              <a:rPr lang="en-US" dirty="0" smtClean="0"/>
               <a:t>Click to edit Master text styles</a:t>
             </a:r>
           </a:p>
           <a:p>
             <a:pPr lvl="1"/>
             <a:r>
-              <a:rPr lang="en-US" smtClean="0"/>
+              <a:rPr lang="en-US" dirty="0" smtClean="0"/>
               <a:t>Second level</a:t>
             </a:r>
           </a:p>
           <a:p>
             <a:pPr lvl="2"/>
             <a:r>
-              <a:rPr lang="en-US" smtClean="0"/>
+              <a:rPr lang="en-US" dirty="0" smtClean="0"/>
               <a:t>Third level</a:t>
             </a:r>
           </a:p>
           <a:p>
             <a:pPr lvl="3"/>
             <a:r>
-              <a:rPr lang="en-US" smtClean="0"/>
+              <a:rPr lang="en-US" dirty="0" smtClean="0"/>
               <a:t>Fourth level</a:t>
             </a:r>
           </a:p>
           <a:p>
             <a:pPr lvl="4"/>
             <a:r>
-              <a:rPr lang="en-US" smtClean="0"/>
+              <a:rPr lang="en-US" dirty="0" smtClean="0"/>
               <a:t>Fifth level</a:t>
             </a:r>
-            <a:endParaRPr lang="en-US"/>
+            <a:endParaRPr lang="en-US" dirty="0"/>
           </a:p>
         </p:txBody>
       </p:sp>
@@ -1724,7 +1730,13 @@
         </p:spPr>
         <p:txBody>
           <a:bodyPr/>
-          <a:lstStyle/>
+          <a:lstStyle>
+            <a:lvl1pPr>
+              <a:defRPr>
+                <a:latin typeface="+mn-lt"/>
+              </a:defRPr>
+            </a:lvl1pPr>
+          </a:lstStyle>
           <a:p>
             <a:r>
               <a:rPr lang="en-US" smtClean="0"/>
@@ -1752,7 +1764,33 @@
         </p:spPr>
         <p:txBody>
           <a:bodyPr/>
-          <a:lstStyle/>
+          <a:lstStyle>
+            <a:lvl1pPr>
+              <a:defRPr>
+                <a:latin typeface="+mn-lt"/>
+              </a:defRPr>
+            </a:lvl1pPr>
+            <a:lvl2pPr>
+              <a:defRPr>
+                <a:latin typeface="+mn-lt"/>
+              </a:defRPr>
+            </a:lvl2pPr>
+            <a:lvl3pPr>
+              <a:defRPr>
+                <a:latin typeface="+mn-lt"/>
+              </a:defRPr>
+            </a:lvl3pPr>
+            <a:lvl4pPr>
+              <a:defRPr>
+                <a:latin typeface="+mn-lt"/>
+              </a:defRPr>
+            </a:lvl4pPr>
+            <a:lvl5pPr>
+              <a:defRPr>
+                <a:latin typeface="+mn-lt"/>
+              </a:defRPr>
+            </a:lvl5pPr>
+          </a:lstStyle>
           <a:p>
             <a:pPr lvl="0"/>
             <a:r>
@@ -1809,7 +1847,33 @@
         </p:spPr>
         <p:txBody>
           <a:bodyPr/>
-          <a:lstStyle/>
+          <a:lstStyle>
+            <a:lvl1pPr>
+              <a:defRPr>
+                <a:latin typeface="+mn-lt"/>
+              </a:defRPr>
+            </a:lvl1pPr>
+            <a:lvl2pPr>
+              <a:defRPr>
+                <a:latin typeface="+mn-lt"/>
+              </a:defRPr>
+            </a:lvl2pPr>
+            <a:lvl3pPr>
+              <a:defRPr>
+                <a:latin typeface="+mn-lt"/>
+              </a:defRPr>
+            </a:lvl3pPr>
+            <a:lvl4pPr>
+              <a:defRPr>
+                <a:latin typeface="+mn-lt"/>
+              </a:defRPr>
+            </a:lvl4pPr>
+            <a:lvl5pPr>
+              <a:defRPr>
+                <a:latin typeface="+mn-lt"/>
+              </a:defRPr>
+            </a:lvl5pPr>
+          </a:lstStyle>
           <a:p>
             <a:pPr lvl="0"/>
             <a:r>
@@ -1863,7 +1927,9 @@
           <a:bodyPr/>
           <a:lstStyle>
             <a:lvl1pPr>
-              <a:defRPr/>
+              <a:defRPr>
+                <a:latin typeface="+mn-lt"/>
+              </a:defRPr>
             </a:lvl1pPr>
           </a:lstStyle>
           <a:p>
@@ -1889,7 +1955,9 @@
           <a:bodyPr/>
           <a:lstStyle>
             <a:lvl1pPr>
-              <a:defRPr/>
+              <a:defRPr>
+                <a:latin typeface="+mn-lt"/>
+              </a:defRPr>
             </a:lvl1pPr>
           </a:lstStyle>
           <a:p>
@@ -1897,7 +1965,7 @@
               <a:defRPr/>
             </a:pPr>
             <a:fld id="{BD11CE9F-2AF3-4F59-A6D7-3D3804C76BF1}" type="slidenum">
-              <a:rPr lang="en-US"/>
+              <a:rPr lang="en-US" smtClean="0"/>
               <a:pPr>
                 <a:defRPr/>
               </a:pPr>
@@ -1950,7 +2018,7 @@
         </p:nvPicPr>
         <p:blipFill>
           <a:blip r:embed="rId7" cstate="print"/>
-          <a:srcRect/>
+          <a:srcRect b="32963"/>
           <a:stretch>
             <a:fillRect/>
           </a:stretch>
@@ -1958,7 +2026,7 @@
         <p:spPr bwMode="auto">
           <a:xfrm>
             <a:off x="19050" y="0"/>
-            <a:ext cx="9124950" cy="6858000"/>
+            <a:ext cx="9124950" cy="4597400"/>
           </a:xfrm>
           <a:prstGeom prst="rect">
             <a:avLst/>
@@ -2166,7 +2234,7 @@
               <a:defRPr/>
             </a:pPr>
             <a:fld id="{A3A3B9AC-2D9B-4AE3-828B-D89195528FAC}" type="slidenum">
-              <a:rPr lang="en-US"/>
+              <a:rPr lang="en-US" smtClean="0"/>
               <a:pPr>
                 <a:defRPr/>
               </a:pPr>
@@ -2200,7 +2268,7 @@
           <a:solidFill>
             <a:schemeClr val="tx1"/>
           </a:solidFill>
-          <a:latin typeface="+mj-lt"/>
+          <a:latin typeface="+mn-lt"/>
           <a:ea typeface="+mj-ea"/>
           <a:cs typeface="+mj-cs"/>
         </a:defRPr>
@@ -2584,35 +2652,6 @@
       </p:grpSpPr>
       <p:sp>
         <p:nvSpPr>
-          <p:cNvPr id="4" name="Slide Number Placeholder 5"/>
-          <p:cNvSpPr>
-            <a:spLocks noGrp="1"/>
-          </p:cNvSpPr>
-          <p:nvPr>
-            <p:ph type="sldNum" sz="quarter" idx="12"/>
-          </p:nvPr>
-        </p:nvSpPr>
-        <p:spPr/>
-        <p:txBody>
-          <a:bodyPr/>
-          <a:lstStyle/>
-          <a:p>
-            <a:pPr>
-              <a:defRPr/>
-            </a:pPr>
-            <a:fld id="{C3E9FB87-80C4-4016-8391-313B470847DA}" type="slidenum">
-              <a:rPr lang="en-US"/>
-              <a:pPr>
-                <a:defRPr/>
-              </a:pPr>
-              <a:t>1</a:t>
-            </a:fld>
-            <a:endParaRPr lang="en-US"/>
-          </a:p>
-        </p:txBody>
-      </p:sp>
-      <p:sp>
-        <p:nvSpPr>
           <p:cNvPr id="8194" name="Rectangle 4"/>
           <p:cNvSpPr>
             <a:spLocks/>
@@ -2621,7 +2660,7 @@
         </p:nvSpPr>
         <p:spPr bwMode="auto">
           <a:xfrm>
-            <a:off x="508000" y="4205288"/>
+            <a:off x="514350" y="623888"/>
             <a:ext cx="8115300" cy="1146175"/>
           </a:xfrm>
           <a:prstGeom prst="rect">
@@ -2642,28 +2681,43 @@
             <a:pPr algn="ctr" defTabSz="457200"/>
             <a:r>
               <a:rPr lang="en-US" sz="3800" dirty="0">
+                <a:solidFill>
+                  <a:srgbClr val="002060"/>
+                </a:solidFill>
                 <a:latin typeface="Calibri" pitchFamily="34" charset="0"/>
               </a:rPr>
               <a:t>Calendar Appointment and </a:t>
             </a:r>
             <a:br>
               <a:rPr lang="en-US" sz="3800" dirty="0">
+                <a:solidFill>
+                  <a:srgbClr val="002060"/>
+                </a:solidFill>
                 <a:latin typeface="Calibri" pitchFamily="34" charset="0"/>
               </a:rPr>
             </a:br>
             <a:r>
               <a:rPr lang="en-US" sz="3800" dirty="0">
+                <a:solidFill>
+                  <a:srgbClr val="002060"/>
+                </a:solidFill>
                 <a:latin typeface="Calibri" pitchFamily="34" charset="0"/>
               </a:rPr>
               <a:t>To-Do List </a:t>
             </a:r>
             <a:r>
               <a:rPr lang="en-US" sz="3800" dirty="0" smtClean="0">
+                <a:solidFill>
+                  <a:srgbClr val="002060"/>
+                </a:solidFill>
                 <a:latin typeface="Calibri" pitchFamily="34" charset="0"/>
               </a:rPr>
               <a:t>Manager – A Mobile App</a:t>
             </a:r>
             <a:endParaRPr lang="en-US" sz="3800" dirty="0">
+              <a:solidFill>
+                <a:srgbClr val="002060"/>
+              </a:solidFill>
               <a:latin typeface="Calibri" pitchFamily="34" charset="0"/>
             </a:endParaRPr>
           </a:p>
@@ -2679,7 +2733,7 @@
         </p:nvSpPr>
         <p:spPr bwMode="auto">
           <a:xfrm>
-            <a:off x="1382713" y="5778500"/>
+            <a:off x="1371600" y="5600700"/>
             <a:ext cx="6400800" cy="879475"/>
           </a:xfrm>
           <a:prstGeom prst="rect">
@@ -2708,7 +2762,7 @@
               <a:buNone/>
             </a:pPr>
             <a:r>
-              <a:rPr lang="en-US" sz="2800">
+              <a:rPr lang="en-US" sz="2800" dirty="0">
                 <a:solidFill>
                   <a:srgbClr val="1C1C1C"/>
                 </a:solidFill>
@@ -2729,7 +2783,7 @@
               <a:buNone/>
             </a:pPr>
             <a:r>
-              <a:rPr lang="en-US" sz="2000">
+              <a:rPr lang="en-US" sz="2000" dirty="0">
                 <a:solidFill>
                   <a:srgbClr val="1C1C1C"/>
                 </a:solidFill>
@@ -2750,7 +2804,7 @@
               <a:buNone/>
             </a:pPr>
             <a:r>
-              <a:rPr lang="en-US" sz="2000">
+              <a:rPr lang="en-US" sz="2000" dirty="0">
                 <a:solidFill>
                   <a:srgbClr val="1C1C1C"/>
                 </a:solidFill>
@@ -2818,7 +2872,7 @@
               </a:pPr>
               <a:t>2</a:t>
             </a:fld>
-            <a:endParaRPr lang="en-US"/>
+            <a:endParaRPr lang="en-US" dirty="0"/>
           </a:p>
         </p:txBody>
       </p:sp>
@@ -2842,7 +2896,11 @@
             <a:pPr eaLnBrk="1" hangingPunct="1"/>
             <a:r>
               <a:rPr lang="en-US" sz="3400" dirty="0" smtClean="0"/>
-              <a:t> Introduction</a:t>
+              <a:t> </a:t>
+            </a:r>
+            <a:r>
+              <a:rPr lang="en-US" sz="3400" dirty="0" smtClean="0"/>
+              <a:t>Calendar &amp; To-Do List App Review</a:t>
             </a:r>
             <a:endParaRPr lang="en-US" sz="3400" dirty="0" smtClean="0"/>
           </a:p>
@@ -2860,34 +2918,56 @@
         </p:nvSpPr>
         <p:spPr>
           <a:xfrm>
-            <a:off x="368300" y="989013"/>
-            <a:ext cx="8432800" cy="5135562"/>
+            <a:off x="368300" y="779463"/>
+            <a:ext cx="8432800" cy="2135187"/>
           </a:xfrm>
         </p:spPr>
         <p:txBody>
-          <a:bodyPr/>
+          <a:bodyPr>
+            <a:normAutofit fontScale="92500" lnSpcReduction="10000"/>
+          </a:bodyPr>
           <a:lstStyle/>
           <a:p>
             <a:pPr marL="571500" indent="-571500" eaLnBrk="1" hangingPunct="1">
+              <a:lnSpc>
+                <a:spcPct val="110000"/>
+              </a:lnSpc>
+              <a:spcBef>
+                <a:spcPts val="0"/>
+              </a:spcBef>
               <a:buFont typeface="Arial" charset="0"/>
               <a:buNone/>
             </a:pPr>
             <a:r>
-              <a:rPr lang="en-US" sz="2600" b="1" dirty="0" smtClean="0"/>
-              <a:t>Overview:</a:t>
+              <a:rPr lang="en-US" sz="2600" b="1" kern="1200" dirty="0" smtClean="0">
+                <a:solidFill>
+                  <a:srgbClr val="008000"/>
+                </a:solidFill>
+                <a:latin typeface="Calibri" pitchFamily="34" charset="0"/>
+                <a:cs typeface="Arial" charset="0"/>
+              </a:rPr>
+              <a:t>The History and Our Motivation:</a:t>
             </a:r>
           </a:p>
           <a:p>
             <a:pPr marL="571500" indent="-571500" eaLnBrk="1" hangingPunct="1">
-              <a:buFont typeface="Arial" charset="0"/>
+              <a:lnSpc>
+                <a:spcPct val="110000"/>
+              </a:lnSpc>
+              <a:spcBef>
+                <a:spcPts val="0"/>
+              </a:spcBef>
               <a:buNone/>
             </a:pPr>
-            <a:endParaRPr lang="en-US" sz="1400" b="1" dirty="0" smtClean="0"/>
+            <a:endParaRPr lang="en-US" sz="1200" b="1" dirty="0" smtClean="0"/>
           </a:p>
           <a:p>
             <a:pPr marL="571500" indent="-571500" eaLnBrk="1" hangingPunct="1">
+              <a:lnSpc>
+                <a:spcPct val="110000"/>
+              </a:lnSpc>
               <a:spcBef>
-                <a:spcPct val="0"/>
+                <a:spcPts val="0"/>
               </a:spcBef>
               <a:spcAft>
                 <a:spcPct val="40000"/>
@@ -2897,13 +2977,16 @@
             </a:pPr>
             <a:r>
               <a:rPr lang="en-US" sz="2200" dirty="0" smtClean="0"/>
-              <a:t>It is common for a person to have multiple different, disjoint calendars (professional, personal, education etc.) across several platforms.</a:t>
+              <a:t>For our web application, Team Thundercats developed a Calendar and To-Do List application.</a:t>
             </a:r>
           </a:p>
           <a:p>
             <a:pPr marL="571500" indent="-571500" eaLnBrk="1" hangingPunct="1">
+              <a:lnSpc>
+                <a:spcPct val="110000"/>
+              </a:lnSpc>
               <a:spcBef>
-                <a:spcPct val="0"/>
+                <a:spcPts val="0"/>
               </a:spcBef>
               <a:spcAft>
                 <a:spcPct val="40000"/>
@@ -2913,25 +2996,8 @@
             </a:pPr>
             <a:r>
               <a:rPr lang="en-US" sz="2200" dirty="0" smtClean="0"/>
-              <a:t>Almost all of us have routine chores and errands as well as larger tasks that make-up a formal or informal to-do list.</a:t>
-            </a:r>
-          </a:p>
-          <a:p>
-            <a:pPr marL="571500" indent="-571500" eaLnBrk="1" hangingPunct="1">
-              <a:spcBef>
-                <a:spcPct val="0"/>
-              </a:spcBef>
-              <a:spcAft>
-                <a:spcPct val="40000"/>
-              </a:spcAft>
-              <a:buFontTx/>
-              <a:buChar char="•"/>
-            </a:pPr>
-            <a:r>
-              <a:rPr lang="en-US" sz="2200" dirty="0" smtClean="0"/>
-              <a:t>Most people do not employ any system to manage and visualize all of this disparate information.</a:t>
-            </a:r>
-            <a:endParaRPr lang="en-US" sz="2000" b="1" dirty="0" smtClean="0"/>
+              <a:t>The experience that can be gained converting an application from one platform to another was very attractive to us.</a:t>
+            </a:r>
           </a:p>
         </p:txBody>
       </p:sp>
@@ -2945,8 +3011,8 @@
         </p:nvSpPr>
         <p:spPr bwMode="auto">
           <a:xfrm>
-            <a:off x="368300" y="4559300"/>
-            <a:ext cx="8432800" cy="1098550"/>
+            <a:off x="242888" y="5416550"/>
+            <a:ext cx="8658224" cy="784830"/>
           </a:xfrm>
           <a:prstGeom prst="rect">
             <a:avLst/>
@@ -2960,37 +3026,186 @@
           </a:ln>
         </p:spPr>
         <p:txBody>
-          <a:bodyPr>
+          <a:bodyPr wrap="square">
             <a:spAutoFit/>
           </a:bodyPr>
           <a:lstStyle/>
           <a:p>
             <a:r>
-              <a:rPr lang="en-US" sz="2600">
+              <a:rPr lang="en-US" sz="2400" dirty="0">
+                <a:solidFill>
+                  <a:srgbClr val="008000"/>
+                </a:solidFill>
                 <a:latin typeface="Calibri" pitchFamily="34" charset="0"/>
               </a:rPr>
               <a:t>Goal:</a:t>
             </a:r>
             <a:r>
-              <a:rPr lang="en-US" b="0">
+              <a:rPr lang="en-US" sz="2400" b="0" dirty="0">
+                <a:solidFill>
+                  <a:srgbClr val="008000"/>
+                </a:solidFill>
                 <a:latin typeface="Calibri" pitchFamily="34" charset="0"/>
               </a:rPr>
               <a:t> </a:t>
             </a:r>
-          </a:p>
-          <a:p>
-            <a:endParaRPr lang="en-US" b="0">
+            <a:r>
+              <a:rPr lang="en-US" sz="2100" dirty="0" smtClean="0">
+                <a:latin typeface="Calibri" pitchFamily="34" charset="0"/>
+              </a:rPr>
+              <a:t>Create a compelling user experience on a mobile device that allows </a:t>
+            </a:r>
+          </a:p>
+          <a:p>
+            <a:pPr algn="ctr"/>
+            <a:r>
+              <a:rPr lang="en-US" sz="2100" dirty="0" smtClean="0">
+                <a:latin typeface="Calibri" pitchFamily="34" charset="0"/>
+              </a:rPr>
+              <a:t>users to</a:t>
+            </a:r>
+            <a:r>
+              <a:rPr lang="en-US" sz="2100" dirty="0" smtClean="0">
+                <a:latin typeface="Calibri" pitchFamily="34" charset="0"/>
+              </a:rPr>
+              <a:t> s</a:t>
+            </a:r>
+            <a:r>
+              <a:rPr lang="en-US" sz="2100" dirty="0" smtClean="0">
+                <a:latin typeface="Calibri" pitchFamily="34" charset="0"/>
+              </a:rPr>
+              <a:t>implify </a:t>
+            </a:r>
+            <a:r>
+              <a:rPr lang="en-US" sz="2100" dirty="0">
+                <a:latin typeface="Calibri" pitchFamily="34" charset="0"/>
+              </a:rPr>
+              <a:t>the </a:t>
+            </a:r>
+            <a:r>
+              <a:rPr lang="en-US" sz="2100" dirty="0" smtClean="0">
+                <a:latin typeface="Calibri" pitchFamily="34" charset="0"/>
+              </a:rPr>
+              <a:t>management </a:t>
+            </a:r>
+            <a:r>
+              <a:rPr lang="en-US" sz="2100" dirty="0">
+                <a:latin typeface="Calibri" pitchFamily="34" charset="0"/>
+              </a:rPr>
+              <a:t>of </a:t>
+            </a:r>
+            <a:r>
+              <a:rPr lang="en-US" sz="2100" dirty="0" smtClean="0">
+                <a:latin typeface="Calibri" pitchFamily="34" charset="0"/>
+              </a:rPr>
+              <a:t>their </a:t>
+            </a:r>
+            <a:r>
+              <a:rPr lang="en-US" sz="2100" dirty="0">
+                <a:latin typeface="Calibri" pitchFamily="34" charset="0"/>
+              </a:rPr>
+              <a:t>daily calendars and to-do </a:t>
+            </a:r>
+            <a:r>
+              <a:rPr lang="en-US" sz="2100" dirty="0" smtClean="0">
+                <a:latin typeface="Calibri" pitchFamily="34" charset="0"/>
+              </a:rPr>
+              <a:t>lists</a:t>
+            </a:r>
+            <a:endParaRPr lang="en-US" sz="2100" dirty="0">
               <a:latin typeface="Calibri" pitchFamily="34" charset="0"/>
             </a:endParaRPr>
           </a:p>
-          <a:p>
-            <a:pPr algn="ctr"/>
-            <a:r>
-              <a:rPr lang="en-US" sz="2200" b="0">
+        </p:txBody>
+      </p:sp>
+      <p:sp>
+        <p:nvSpPr>
+          <p:cNvPr id="6" name="Rectangle 5"/>
+          <p:cNvSpPr/>
+          <p:nvPr/>
+        </p:nvSpPr>
+        <p:spPr>
+          <a:xfrm>
+            <a:off x="368300" y="3075185"/>
+            <a:ext cx="8432800" cy="1969770"/>
+          </a:xfrm>
+          <a:prstGeom prst="rect">
+            <a:avLst/>
+          </a:prstGeom>
+        </p:spPr>
+        <p:txBody>
+          <a:bodyPr wrap="square">
+            <a:spAutoFit/>
+          </a:bodyPr>
+          <a:lstStyle/>
+          <a:p>
+            <a:pPr marL="571500" indent="-571500" eaLnBrk="1" hangingPunct="1">
+              <a:buFont typeface="Arial" charset="0"/>
+              <a:buNone/>
+            </a:pPr>
+            <a:r>
+              <a:rPr lang="en-US" sz="2400" dirty="0" smtClean="0">
+                <a:solidFill>
+                  <a:srgbClr val="008000"/>
+                </a:solidFill>
                 <a:latin typeface="Calibri" pitchFamily="34" charset="0"/>
               </a:rPr>
-              <a:t>Simplify the management of a user’s daily calendars and to-do list</a:t>
-            </a:r>
+              <a:t>The Problem:</a:t>
+            </a:r>
+          </a:p>
+          <a:p>
+            <a:pPr marL="571500" indent="-571500" eaLnBrk="1" hangingPunct="1">
+              <a:buFont typeface="Arial" charset="0"/>
+              <a:buNone/>
+            </a:pPr>
+            <a:endParaRPr lang="en-US" sz="1000" dirty="0" smtClean="0">
+              <a:latin typeface="+mn-lt"/>
+            </a:endParaRPr>
+          </a:p>
+          <a:p>
+            <a:pPr marL="571500" indent="-571500">
+              <a:spcAft>
+                <a:spcPct val="40000"/>
+              </a:spcAft>
+              <a:buFontTx/>
+              <a:buChar char="•"/>
+            </a:pPr>
+            <a:r>
+              <a:rPr lang="en-US" sz="2000" b="0" dirty="0" smtClean="0">
+                <a:latin typeface="+mn-lt"/>
+              </a:rPr>
+              <a:t>Individuals often have </a:t>
+            </a:r>
+            <a:r>
+              <a:rPr lang="en-US" sz="2000" b="0" dirty="0" smtClean="0">
+                <a:latin typeface="+mn-lt"/>
+              </a:rPr>
+              <a:t>multiple different, disjoint calendars (professional, personal, education etc.) across several platforms.</a:t>
+            </a:r>
+          </a:p>
+          <a:p>
+            <a:pPr marL="571500" indent="-571500">
+              <a:spcAft>
+                <a:spcPct val="40000"/>
+              </a:spcAft>
+              <a:buFontTx/>
+              <a:buChar char="•"/>
+            </a:pPr>
+            <a:r>
+              <a:rPr lang="en-US" sz="2000" b="0" dirty="0" smtClean="0">
+                <a:latin typeface="+mn-lt"/>
+              </a:rPr>
+              <a:t>Almost all of us have routine chores and errands as well as larger tasks that make-up a formal or informal to-do list</a:t>
+            </a:r>
+            <a:r>
+              <a:rPr lang="en-US" sz="2000" b="0" dirty="0" smtClean="0">
+                <a:latin typeface="+mn-lt"/>
+              </a:rPr>
+              <a:t>.</a:t>
+            </a:r>
+            <a:endParaRPr lang="en-US" sz="2000" b="0" dirty="0" smtClean="0">
+              <a:latin typeface="+mn-lt"/>
+            </a:endParaRPr>
           </a:p>
         </p:txBody>
       </p:sp>
@@ -3028,6 +3243,51 @@
                                     <p:set>
                                       <p:cBhvr>
                                         <p:cTn id="6" dur="1" fill="hold">
+                                          <p:stCondLst>
+                                            <p:cond delay="0"/>
+                                          </p:stCondLst>
+                                        </p:cTn>
+                                        <p:tgtEl>
+                                          <p:spTgt spid="6"/>
+                                        </p:tgtEl>
+                                        <p:attrNameLst>
+                                          <p:attrName>style.visibility</p:attrName>
+                                        </p:attrNameLst>
+                                      </p:cBhvr>
+                                      <p:to>
+                                        <p:strVal val="visible"/>
+                                      </p:to>
+                                    </p:set>
+                                  </p:childTnLst>
+                                </p:cTn>
+                              </p:par>
+                            </p:childTnLst>
+                          </p:cTn>
+                        </p:par>
+                      </p:childTnLst>
+                    </p:cTn>
+                  </p:par>
+                  <p:par>
+                    <p:cTn id="7" fill="hold">
+                      <p:stCondLst>
+                        <p:cond delay="indefinite"/>
+                      </p:stCondLst>
+                      <p:childTnLst>
+                        <p:par>
+                          <p:cTn id="8" fill="hold">
+                            <p:stCondLst>
+                              <p:cond delay="0"/>
+                            </p:stCondLst>
+                            <p:childTnLst>
+                              <p:par>
+                                <p:cTn id="9" presetID="1" presetClass="entr" presetSubtype="0" fill="hold" grpId="0" nodeType="clickEffect">
+                                  <p:stCondLst>
+                                    <p:cond delay="0"/>
+                                  </p:stCondLst>
+                                  <p:childTnLst>
+                                    <p:set>
+                                      <p:cBhvr>
+                                        <p:cTn id="10" dur="1" fill="hold">
                                           <p:stCondLst>
                                             <p:cond delay="0"/>
                                           </p:stCondLst>
@@ -3075,6 +3335,7 @@
     </p:tnLst>
     <p:bldLst>
       <p:bldP spid="9222" grpId="0"/>
+      <p:bldP spid="6" grpId="0"/>
     </p:bldLst>
   </p:timing>
 </p:sld>
@@ -3110,14 +3371,15 @@
         <p:spPr/>
         <p:txBody>
           <a:bodyPr>
-            <a:normAutofit fontScale="90000"/>
+            <a:noAutofit/>
           </a:bodyPr>
           <a:lstStyle/>
           <a:p>
             <a:r>
-              <a:rPr lang="en-US" sz="3400" smtClean="0"/>
-              <a:t>Solution &amp; Benefits</a:t>
-            </a:r>
+              <a:rPr lang="en-US" sz="4000" dirty="0" smtClean="0"/>
+              <a:t>Solution &amp; Challenges</a:t>
+            </a:r>
+            <a:endParaRPr lang="en-US" sz="4000" dirty="0" smtClean="0"/>
           </a:p>
         </p:txBody>
       </p:sp>
@@ -3131,8 +3393,8 @@
         </p:nvSpPr>
         <p:spPr bwMode="auto">
           <a:xfrm>
-            <a:off x="266700" y="1192213"/>
-            <a:ext cx="8432800" cy="5135562"/>
+            <a:off x="266700" y="1052513"/>
+            <a:ext cx="8432800" cy="1538287"/>
           </a:xfrm>
           <a:prstGeom prst="rect">
             <a:avLst/>
@@ -3160,17 +3422,20 @@
               <a:buNone/>
             </a:pPr>
             <a:r>
-              <a:rPr lang="en-US" sz="2600">
+              <a:rPr lang="en-US" sz="2600" dirty="0" smtClean="0">
                 <a:latin typeface="Calibri" pitchFamily="34" charset="0"/>
               </a:rPr>
               <a:t>Solution:</a:t>
             </a:r>
             <a:r>
-              <a:rPr lang="en-US" sz="2600" b="0">
+              <a:rPr lang="en-US" sz="2600" b="0" dirty="0" smtClean="0">
                 <a:latin typeface="Calibri" pitchFamily="34" charset="0"/>
               </a:rPr>
               <a:t> </a:t>
             </a:r>
+            <a:endParaRPr lang="en-US" sz="2600" b="0" dirty="0">
+              <a:latin typeface="Calibri" pitchFamily="34" charset="0"/>
+            </a:endParaRPr>
           </a:p>
           <a:p>
             <a:pPr marL="571500" indent="-571500" defTabSz="457200">
@@ -3183,7 +3448,7 @@
               <a:buFont typeface="Arial" charset="0"/>
               <a:buNone/>
             </a:pPr>
-            <a:endParaRPr lang="en-US" b="0">
+            <a:endParaRPr lang="en-US" sz="1000" b="0" dirty="0">
               <a:latin typeface="Calibri" pitchFamily="34" charset="0"/>
             </a:endParaRPr>
           </a:p>
@@ -3194,7 +3459,7 @@
               </a:spcBef>
             </a:pPr>
             <a:r>
-              <a:rPr lang="en-US" sz="2200" b="0">
+              <a:rPr lang="en-US" sz="2400" b="0" dirty="0">
                 <a:latin typeface="Calibri" pitchFamily="34" charset="0"/>
               </a:rPr>
               <a:t>Integrate all of a user’s calendars into a single web</a:t>
@@ -3207,39 +3472,18 @@
               </a:spcBef>
             </a:pPr>
             <a:r>
-              <a:rPr lang="en-US" sz="2200" b="0">
+              <a:rPr lang="en-US" sz="2400" b="0" dirty="0">
                 <a:latin typeface="Calibri" pitchFamily="34" charset="0"/>
               </a:rPr>
-              <a:t>interface and juxtapose it with the user’s to-do list</a:t>
-            </a:r>
-            <a:endParaRPr lang="en-US" sz="2200">
-              <a:latin typeface="Calibri" pitchFamily="34" charset="0"/>
-            </a:endParaRPr>
-          </a:p>
-          <a:p>
-            <a:pPr marL="571500" indent="-571500" defTabSz="457200">
-              <a:lnSpc>
-                <a:spcPct val="90000"/>
-              </a:lnSpc>
-              <a:spcBef>
-                <a:spcPct val="20000"/>
-              </a:spcBef>
-              <a:buFont typeface="Arial" charset="0"/>
-              <a:buNone/>
-            </a:pPr>
-            <a:endParaRPr lang="en-US" sz="2200" b="0">
-              <a:latin typeface="Calibri" pitchFamily="34" charset="0"/>
-            </a:endParaRPr>
-          </a:p>
-          <a:p>
-            <a:pPr marL="571500" indent="-571500" defTabSz="457200">
-              <a:spcAft>
-                <a:spcPct val="40000"/>
-              </a:spcAft>
-              <a:buFontTx/>
-              <a:buChar char="•"/>
-            </a:pPr>
-            <a:endParaRPr lang="en-US" sz="2200" b="0">
+              <a:t>interface and juxtapose it with the user’s to-do </a:t>
+            </a:r>
+            <a:r>
+              <a:rPr lang="en-US" sz="2400" b="0" dirty="0" smtClean="0">
+                <a:latin typeface="Calibri" pitchFamily="34" charset="0"/>
+              </a:rPr>
+              <a:t>list</a:t>
+            </a:r>
+            <a:endParaRPr lang="en-US" sz="2200" b="0" dirty="0">
               <a:latin typeface="Calibri" pitchFamily="34" charset="0"/>
             </a:endParaRPr>
           </a:p>
@@ -3255,8 +3499,8 @@
         </p:nvSpPr>
         <p:spPr bwMode="auto">
           <a:xfrm>
-            <a:off x="279400" y="3352800"/>
-            <a:ext cx="8432800" cy="2225675"/>
+            <a:off x="279400" y="2895600"/>
+            <a:ext cx="8432800" cy="3200876"/>
           </a:xfrm>
           <a:prstGeom prst="rect">
             <a:avLst/>
@@ -3277,15 +3521,18 @@
           <a:p>
             <a:pPr marL="457200" indent="-457200"/>
             <a:r>
-              <a:rPr lang="en-US" sz="2600">
+              <a:rPr lang="en-US" sz="2600" dirty="0" smtClean="0">
                 <a:latin typeface="Calibri" pitchFamily="34" charset="0"/>
               </a:rPr>
-              <a:t>Application Benefits:</a:t>
-            </a:r>
+              <a:t>Challenges of Converting from Web to Mobile:</a:t>
+            </a:r>
+            <a:endParaRPr lang="en-US" sz="2600" dirty="0">
+              <a:latin typeface="Calibri" pitchFamily="34" charset="0"/>
+            </a:endParaRPr>
           </a:p>
           <a:p>
             <a:pPr marL="457200" indent="-457200"/>
-            <a:endParaRPr lang="en-US" sz="2600">
+            <a:endParaRPr lang="en-US" sz="2600" dirty="0" smtClean="0">
               <a:latin typeface="Calibri" pitchFamily="34" charset="0"/>
             </a:endParaRPr>
           </a:p>
@@ -3295,11 +3542,50 @@
               <a:buChar char="•"/>
             </a:pPr>
             <a:r>
-              <a:rPr lang="en-US" sz="2200" b="0">
+              <a:rPr lang="en-US" sz="2200" dirty="0" smtClean="0">
+                <a:solidFill>
+                  <a:srgbClr val="008000"/>
+                </a:solidFill>
                 <a:latin typeface="Calibri" pitchFamily="34" charset="0"/>
               </a:rPr>
-              <a:t>Allow the user to quickly visualize and prioritize all of his/her daily activities using one portal.</a:t>
-            </a:r>
+              <a:t>Translation of the User Experience</a:t>
+            </a:r>
+          </a:p>
+          <a:p>
+            <a:pPr marL="914400" lvl="1" indent="-457200">
+              <a:buFontTx/>
+              <a:buChar char="•"/>
+            </a:pPr>
+            <a:r>
+              <a:rPr lang="en-US" sz="2000" b="0" dirty="0" smtClean="0">
+                <a:latin typeface="Calibri" pitchFamily="34" charset="0"/>
+              </a:rPr>
+              <a:t>The user should enjoy the mobile experience at least as much as their online one.</a:t>
+            </a:r>
+          </a:p>
+          <a:p>
+            <a:pPr marL="914400" lvl="1" indent="-457200">
+              <a:buFontTx/>
+              <a:buChar char="•"/>
+            </a:pPr>
+            <a:r>
+              <a:rPr lang="en-US" sz="2000" b="0" dirty="0" smtClean="0">
+                <a:latin typeface="Calibri" pitchFamily="34" charset="0"/>
+              </a:rPr>
+              <a:t>Leverage mobile specific capabilities (e.g. gestures</a:t>
+            </a:r>
+            <a:r>
+              <a:rPr lang="en-US" sz="2000" b="0" dirty="0" smtClean="0">
+                <a:latin typeface="Calibri" pitchFamily="34" charset="0"/>
+              </a:rPr>
+              <a:t>)</a:t>
+            </a:r>
+          </a:p>
+          <a:p>
+            <a:pPr marL="914400" lvl="1" indent="-457200"/>
+            <a:endParaRPr lang="en-US" sz="2600" dirty="0" smtClean="0">
+              <a:latin typeface="Calibri" pitchFamily="34" charset="0"/>
+            </a:endParaRPr>
           </a:p>
           <a:p>
             <a:pPr marL="457200" indent="-457200">
@@ -3307,10 +3593,25 @@
               <a:buChar char="•"/>
             </a:pPr>
             <a:r>
-              <a:rPr lang="en-US" sz="2200" b="0">
+              <a:rPr lang="en-US" sz="2200" dirty="0" smtClean="0">
+                <a:solidFill>
+                  <a:srgbClr val="008000"/>
+                </a:solidFill>
                 <a:latin typeface="Calibri" pitchFamily="34" charset="0"/>
               </a:rPr>
-              <a:t>Help prevent the belated completion of tasks through reminders (not currently supported) and better organization.</a:t>
+              <a:t>Maintain brand cohesion  </a:t>
+            </a:r>
+          </a:p>
+          <a:p>
+            <a:pPr marL="914400" lvl="1" indent="-457200">
+              <a:buFontTx/>
+              <a:buChar char="•"/>
+            </a:pPr>
+            <a:r>
+              <a:rPr lang="en-US" sz="2000" b="0" dirty="0" smtClean="0">
+                <a:latin typeface="Calibri" pitchFamily="34" charset="0"/>
+              </a:rPr>
+              <a:t>Users should be able to quickly link the two platforms in their minds.</a:t>
             </a:r>
           </a:p>
         </p:txBody>
@@ -3508,88 +3809,59 @@
                   <a:srgbClr val="003300"/>
                 </a:solidFill>
               </a:rPr>
-              <a:t>Concept </a:t>
-            </a:r>
+              <a:t>Concept presented by guest lecturer Robert Nicholson</a:t>
+            </a:r>
+          </a:p>
+          <a:p>
+            <a:pPr lvl="1"/>
+            <a:r>
+              <a:rPr lang="en-US" b="1" dirty="0" smtClean="0">
+                <a:solidFill>
+                  <a:srgbClr val="003300"/>
+                </a:solidFill>
+              </a:rPr>
+              <a:t>Alternate Views</a:t>
+            </a:r>
+          </a:p>
+          <a:p>
+            <a:pPr lvl="2"/>
             <a:r>
               <a:rPr lang="en-US" sz="1800" dirty="0" smtClean="0">
                 <a:solidFill>
                   <a:srgbClr val="003300"/>
                 </a:solidFill>
               </a:rPr>
-              <a:t>p</a:t>
-            </a:r>
+              <a:t>Mobile friendly version of day, week, and month calendar views</a:t>
+            </a:r>
+          </a:p>
+          <a:p>
+            <a:pPr lvl="1">
+              <a:lnSpc>
+                <a:spcPct val="90000"/>
+              </a:lnSpc>
+            </a:pPr>
+            <a:r>
+              <a:rPr lang="en-US" sz="2000" b="1" dirty="0" smtClean="0">
+                <a:solidFill>
+                  <a:srgbClr val="003300"/>
+                </a:solidFill>
+              </a:rPr>
+              <a:t>Persistent Navigation</a:t>
+            </a:r>
+          </a:p>
+          <a:p>
+            <a:pPr lvl="2">
+              <a:lnSpc>
+                <a:spcPct val="90000"/>
+              </a:lnSpc>
+            </a:pPr>
             <a:r>
               <a:rPr lang="en-US" sz="1800" dirty="0" smtClean="0">
                 <a:solidFill>
                   <a:srgbClr val="003300"/>
                 </a:solidFill>
               </a:rPr>
-              <a:t>resented by guest lecturer Robert Nicholson</a:t>
-            </a:r>
-            <a:endParaRPr lang="en-US" sz="1800" dirty="0" smtClean="0">
-              <a:solidFill>
-                <a:srgbClr val="003300"/>
-              </a:solidFill>
-            </a:endParaRPr>
-          </a:p>
-          <a:p>
-            <a:pPr lvl="1"/>
-            <a:r>
-              <a:rPr lang="en-US" b="1" dirty="0" smtClean="0">
-                <a:solidFill>
-                  <a:srgbClr val="003300"/>
-                </a:solidFill>
-              </a:rPr>
-              <a:t>Alternate Views</a:t>
-            </a:r>
-          </a:p>
-          <a:p>
-            <a:pPr lvl="2"/>
-            <a:r>
-              <a:rPr lang="en-US" sz="1800" dirty="0" smtClean="0">
-                <a:solidFill>
-                  <a:srgbClr val="003300"/>
-                </a:solidFill>
-              </a:rPr>
-              <a:t>Mobile friendly version of day, week, and month calendar views</a:t>
-            </a:r>
-          </a:p>
-          <a:p>
-            <a:pPr lvl="1">
-              <a:lnSpc>
-                <a:spcPct val="90000"/>
-              </a:lnSpc>
-            </a:pPr>
-            <a:r>
-              <a:rPr lang="en-US" sz="2000" b="1" dirty="0" smtClean="0">
-                <a:solidFill>
-                  <a:srgbClr val="003300"/>
-                </a:solidFill>
-              </a:rPr>
-              <a:t>Persistent Navigation</a:t>
-            </a:r>
-          </a:p>
-          <a:p>
-            <a:pPr lvl="2">
-              <a:lnSpc>
-                <a:spcPct val="90000"/>
-              </a:lnSpc>
-            </a:pPr>
-            <a:r>
-              <a:rPr lang="en-US" sz="1800" dirty="0" smtClean="0">
-                <a:solidFill>
-                  <a:srgbClr val="003300"/>
-                </a:solidFill>
-              </a:rPr>
-              <a:t>Cognitive Science: Rely on recognition rather than recall</a:t>
-            </a:r>
-            <a:r>
-              <a:rPr lang="en-US" sz="1800" dirty="0" smtClean="0">
-                <a:solidFill>
-                  <a:srgbClr val="003300"/>
-                </a:solidFill>
-              </a:rPr>
-              <a:t>.</a:t>
+              <a:t>Cognitive Science: Rely on recognition rather than recall.</a:t>
             </a:r>
             <a:endParaRPr lang="en-US" sz="2000" b="1" dirty="0" smtClean="0">
               <a:solidFill>
@@ -3640,15 +3912,44 @@
                   <a:srgbClr val="003300"/>
                 </a:solidFill>
               </a:rPr>
-              <a:t>Dropdown </a:t>
-            </a:r>
+              <a:t>Dropdown Chooser</a:t>
+            </a:r>
+          </a:p>
+          <a:p>
+            <a:pPr lvl="2">
+              <a:lnSpc>
+                <a:spcPct val="90000"/>
+              </a:lnSpc>
+            </a:pPr>
+            <a:r>
+              <a:rPr lang="en-US" sz="1800" dirty="0" smtClean="0"/>
+              <a:t>Date Chooser</a:t>
+            </a:r>
+          </a:p>
+          <a:p>
+            <a:pPr lvl="2">
+              <a:lnSpc>
+                <a:spcPct val="90000"/>
+              </a:lnSpc>
+            </a:pPr>
+            <a:r>
+              <a:rPr lang="en-US" sz="1800" dirty="0" smtClean="0"/>
+              <a:t>Time Chooser</a:t>
+            </a:r>
+          </a:p>
+          <a:p>
+            <a:pPr lvl="1">
+              <a:lnSpc>
+                <a:spcPct val="90000"/>
+              </a:lnSpc>
+            </a:pPr>
             <a:r>
               <a:rPr lang="en-US" sz="2000" b="1" dirty="0" smtClean="0">
                 <a:solidFill>
                   <a:srgbClr val="003300"/>
                 </a:solidFill>
               </a:rPr>
-              <a:t>Chooser</a:t>
+              <a:t>Inlay List</a:t>
             </a:r>
           </a:p>
           <a:p>
@@ -3659,62 +3960,8 @@
             </a:pPr>
             <a:r>
               <a:rPr lang="en-US" sz="1800" dirty="0" smtClean="0"/>
-              <a:t>Date Chooser</a:t>
-            </a:r>
-          </a:p>
-          <a:p>
-            <a:pPr lvl="2">
-              <a:lnSpc>
-                <a:spcPct val="90000"/>
-              </a:lnSpc>
-            </a:pPr>
-            <a:r>
-              <a:rPr lang="en-US" sz="1800" dirty="0" smtClean="0"/>
-              <a:t>Time Chooser</a:t>
-            </a:r>
-          </a:p>
-          <a:p>
-            <a:pPr lvl="1">
-              <a:lnSpc>
-                <a:spcPct val="90000"/>
-              </a:lnSpc>
-            </a:pPr>
-            <a:r>
-              <a:rPr lang="en-US" sz="2000" b="1" dirty="0" smtClean="0">
-                <a:solidFill>
-                  <a:srgbClr val="003300"/>
-                </a:solidFill>
-              </a:rPr>
-              <a:t>Inlay </a:t>
-            </a:r>
-            <a:r>
-              <a:rPr lang="en-US" sz="2000" b="1" dirty="0" smtClean="0">
-                <a:solidFill>
-                  <a:srgbClr val="003300"/>
-                </a:solidFill>
-              </a:rPr>
-              <a:t>List</a:t>
-            </a:r>
-          </a:p>
-          <a:p>
-            <a:pPr lvl="2">
-              <a:lnSpc>
-                <a:spcPct val="90000"/>
-              </a:lnSpc>
-            </a:pPr>
-            <a:r>
-              <a:rPr lang="en-US" sz="1800" dirty="0" smtClean="0"/>
-              <a:t>Reduce the visual cognitive load in a to-do </a:t>
-            </a:r>
-            <a:r>
-              <a:rPr lang="en-US" sz="1800" dirty="0" smtClean="0"/>
-              <a:t>l</a:t>
-            </a:r>
-            <a:r>
-              <a:rPr lang="en-US" sz="1800" dirty="0" smtClean="0"/>
-              <a:t>ist</a:t>
-            </a:r>
-            <a:endParaRPr lang="en-US" sz="1800" dirty="0" smtClean="0"/>
+              <a:t>Reduce the visual cognitive load in a to-do list</a:t>
+            </a:r>
           </a:p>
         </p:txBody>
       </p:sp>
@@ -3762,7 +4009,9 @@
         </p:nvSpPr>
         <p:spPr/>
         <p:txBody>
-          <a:bodyPr/>
+          <a:bodyPr>
+            <a:normAutofit/>
+          </a:bodyPr>
           <a:lstStyle/>
           <a:p>
             <a:r>
@@ -3868,15 +4117,7 @@
                   <a:srgbClr val="003300"/>
                 </a:solidFill>
               </a:rPr>
-              <a:t>Pyramid </a:t>
-            </a:r>
-            <a:r>
-              <a:rPr lang="en-US" b="1" dirty="0" smtClean="0">
-                <a:solidFill>
-                  <a:srgbClr val="003300"/>
-                </a:solidFill>
-              </a:rPr>
-              <a:t>Navigation</a:t>
+              <a:t>Pyramid Navigation</a:t>
             </a:r>
           </a:p>
           <a:p>

</xml_diff>

<commit_message>
Finalizing mobile presentation for CS235
</commit_message>
<xml_diff>
--- a/Assignment #4 - iOS Prototype/CS235 - Assignment #4 - Mobile Prototype.pptx
+++ b/Assignment #4 - iOS Prototype/CS235 - Assignment #4 - Mobile Prototype.pptx
@@ -2681,43 +2681,28 @@
             <a:pPr algn="ctr" defTabSz="457200"/>
             <a:r>
               <a:rPr lang="en-US" sz="3800" dirty="0">
-                <a:solidFill>
-                  <a:srgbClr val="002060"/>
-                </a:solidFill>
                 <a:latin typeface="Calibri" pitchFamily="34" charset="0"/>
               </a:rPr>
               <a:t>Calendar Appointment and </a:t>
             </a:r>
             <a:br>
               <a:rPr lang="en-US" sz="3800" dirty="0">
-                <a:solidFill>
-                  <a:srgbClr val="002060"/>
-                </a:solidFill>
                 <a:latin typeface="Calibri" pitchFamily="34" charset="0"/>
               </a:rPr>
             </a:br>
             <a:r>
               <a:rPr lang="en-US" sz="3800" dirty="0">
-                <a:solidFill>
-                  <a:srgbClr val="002060"/>
-                </a:solidFill>
                 <a:latin typeface="Calibri" pitchFamily="34" charset="0"/>
               </a:rPr>
               <a:t>To-Do List </a:t>
             </a:r>
             <a:r>
               <a:rPr lang="en-US" sz="3800" dirty="0" smtClean="0">
-                <a:solidFill>
-                  <a:srgbClr val="002060"/>
-                </a:solidFill>
                 <a:latin typeface="Calibri" pitchFamily="34" charset="0"/>
               </a:rPr>
               <a:t>Manager – A Mobile App</a:t>
             </a:r>
             <a:endParaRPr lang="en-US" sz="3800" dirty="0">
-              <a:solidFill>
-                <a:srgbClr val="002060"/>
-              </a:solidFill>
               <a:latin typeface="Calibri" pitchFamily="34" charset="0"/>
             </a:endParaRPr>
           </a:p>
@@ -2804,13 +2789,22 @@
               <a:buNone/>
             </a:pPr>
             <a:r>
+              <a:rPr lang="en-US" sz="2000" dirty="0" smtClean="0">
+                <a:solidFill>
+                  <a:srgbClr val="1C1C1C"/>
+                </a:solidFill>
+                <a:latin typeface="Calibri" pitchFamily="34" charset="0"/>
+              </a:rPr>
+              <a:t>&amp; Zayd </a:t>
+            </a:r>
+            <a:r>
               <a:rPr lang="en-US" sz="2000" dirty="0">
                 <a:solidFill>
                   <a:srgbClr val="1C1C1C"/>
                 </a:solidFill>
                 <a:latin typeface="Calibri" pitchFamily="34" charset="0"/>
               </a:rPr>
-              <a:t>Zayd Hammoudeh</a:t>
+              <a:t>Hammoudeh</a:t>
             </a:r>
           </a:p>
         </p:txBody>
@@ -2889,20 +2883,20 @@
         <p:spPr/>
         <p:txBody>
           <a:bodyPr>
-            <a:normAutofit fontScale="90000"/>
+            <a:normAutofit/>
           </a:bodyPr>
           <a:lstStyle/>
           <a:p>
             <a:pPr eaLnBrk="1" hangingPunct="1"/>
             <a:r>
-              <a:rPr lang="en-US" sz="3400" dirty="0" smtClean="0"/>
+              <a:rPr lang="en-US" sz="2800" dirty="0" smtClean="0"/>
               <a:t> </a:t>
             </a:r>
             <a:r>
-              <a:rPr lang="en-US" sz="3400" dirty="0" smtClean="0"/>
-              <a:t>Calendar &amp; To-Do List App Review</a:t>
-            </a:r>
-            <a:endParaRPr lang="en-US" sz="3400" dirty="0" smtClean="0"/>
+              <a:rPr lang="en-US" sz="2800" dirty="0" smtClean="0"/>
+              <a:t>Calendar Manager &amp; To-Do List Application</a:t>
+            </a:r>
+            <a:endParaRPr lang="en-US" sz="2800" dirty="0" smtClean="0"/>
           </a:p>
         </p:txBody>
       </p:sp>
@@ -2918,7 +2912,7 @@
         </p:nvSpPr>
         <p:spPr>
           <a:xfrm>
-            <a:off x="368300" y="779463"/>
+            <a:off x="403225" y="4341813"/>
             <a:ext cx="8432800" cy="2135187"/>
           </a:xfrm>
         </p:spPr>
@@ -2977,7 +2971,15 @@
             </a:pPr>
             <a:r>
               <a:rPr lang="en-US" sz="2200" dirty="0" smtClean="0"/>
-              <a:t>For our web application, Team Thundercats developed a Calendar and To-Do List application.</a:t>
+              <a:t>For our web application, Team Thundercats already developed a calendar manager and to-do </a:t>
+            </a:r>
+            <a:r>
+              <a:rPr lang="en-US" sz="2200" dirty="0" smtClean="0"/>
+              <a:t>l</a:t>
+            </a:r>
+            <a:r>
+              <a:rPr lang="en-US" sz="2200" dirty="0" smtClean="0"/>
+              <a:t>ist application.</a:t>
             </a:r>
           </a:p>
           <a:p>
@@ -3011,7 +3013,7 @@
         </p:nvSpPr>
         <p:spPr bwMode="auto">
           <a:xfrm>
-            <a:off x="242888" y="5416550"/>
+            <a:off x="290513" y="3187700"/>
             <a:ext cx="8658224" cy="784830"/>
           </a:xfrm>
           <a:prstGeom prst="rect">
@@ -3050,7 +3052,7 @@
               <a:t> </a:t>
             </a:r>
             <a:r>
-              <a:rPr lang="en-US" sz="2100" dirty="0" smtClean="0">
+              <a:rPr lang="en-US" sz="2100" b="0" dirty="0" smtClean="0">
                 <a:latin typeface="Calibri" pitchFamily="34" charset="0"/>
               </a:rPr>
               <a:t>Create a compelling user experience on a mobile device that allows </a:t>
@@ -3059,60 +3061,60 @@
           <a:p>
             <a:pPr algn="ctr"/>
             <a:r>
-              <a:rPr lang="en-US" sz="2100" dirty="0" smtClean="0">
+              <a:rPr lang="en-US" sz="2100" b="0" dirty="0" smtClean="0">
                 <a:latin typeface="Calibri" pitchFamily="34" charset="0"/>
               </a:rPr>
               <a:t>users to</a:t>
             </a:r>
             <a:r>
-              <a:rPr lang="en-US" sz="2100" dirty="0" smtClean="0">
+              <a:rPr lang="en-US" sz="2100" b="0" dirty="0" smtClean="0">
                 <a:latin typeface="Calibri" pitchFamily="34" charset="0"/>
               </a:rPr>
               <a:t> s</a:t>
             </a:r>
             <a:r>
-              <a:rPr lang="en-US" sz="2100" dirty="0" smtClean="0">
+              <a:rPr lang="en-US" sz="2100" b="0" dirty="0" smtClean="0">
                 <a:latin typeface="Calibri" pitchFamily="34" charset="0"/>
               </a:rPr>
               <a:t>implify </a:t>
             </a:r>
             <a:r>
-              <a:rPr lang="en-US" sz="2100" dirty="0">
+              <a:rPr lang="en-US" sz="2100" b="0" dirty="0">
                 <a:latin typeface="Calibri" pitchFamily="34" charset="0"/>
               </a:rPr>
               <a:t>the </a:t>
             </a:r>
             <a:r>
-              <a:rPr lang="en-US" sz="2100" dirty="0" smtClean="0">
+              <a:rPr lang="en-US" sz="2100" b="0" dirty="0" smtClean="0">
                 <a:latin typeface="Calibri" pitchFamily="34" charset="0"/>
               </a:rPr>
               <a:t>management </a:t>
             </a:r>
             <a:r>
-              <a:rPr lang="en-US" sz="2100" dirty="0">
+              <a:rPr lang="en-US" sz="2100" b="0" dirty="0">
                 <a:latin typeface="Calibri" pitchFamily="34" charset="0"/>
               </a:rPr>
               <a:t>of </a:t>
             </a:r>
             <a:r>
-              <a:rPr lang="en-US" sz="2100" dirty="0" smtClean="0">
+              <a:rPr lang="en-US" sz="2100" b="0" dirty="0" smtClean="0">
                 <a:latin typeface="Calibri" pitchFamily="34" charset="0"/>
               </a:rPr>
               <a:t>their </a:t>
             </a:r>
             <a:r>
-              <a:rPr lang="en-US" sz="2100" dirty="0">
+              <a:rPr lang="en-US" sz="2100" b="0" dirty="0">
                 <a:latin typeface="Calibri" pitchFamily="34" charset="0"/>
               </a:rPr>
               <a:t>daily calendars and to-do </a:t>
             </a:r>
             <a:r>
-              <a:rPr lang="en-US" sz="2100" dirty="0" smtClean="0">
+              <a:rPr lang="en-US" sz="2100" b="0" dirty="0" smtClean="0">
                 <a:latin typeface="Calibri" pitchFamily="34" charset="0"/>
               </a:rPr>
               <a:t>lists</a:t>
             </a:r>
-            <a:endParaRPr lang="en-US" sz="2100" dirty="0">
+            <a:endParaRPr lang="en-US" sz="2100" b="0" dirty="0">
               <a:latin typeface="Calibri" pitchFamily="34" charset="0"/>
             </a:endParaRPr>
           </a:p>
@@ -3126,7 +3128,7 @@
         </p:nvSpPr>
         <p:spPr>
           <a:xfrm>
-            <a:off x="368300" y="3075185"/>
+            <a:off x="403225" y="932060"/>
             <a:ext cx="8432800" cy="1969770"/>
           </a:xfrm>
           <a:prstGeom prst="rect">
@@ -3312,6 +3314,117 @@
                       </p:childTnLst>
                     </p:cTn>
                   </p:par>
+                  <p:par>
+                    <p:cTn id="11" fill="hold">
+                      <p:stCondLst>
+                        <p:cond delay="indefinite"/>
+                      </p:stCondLst>
+                      <p:childTnLst>
+                        <p:par>
+                          <p:cTn id="12" fill="hold">
+                            <p:stCondLst>
+                              <p:cond delay="0"/>
+                            </p:stCondLst>
+                            <p:childTnLst>
+                              <p:par>
+                                <p:cTn id="13" presetID="1" presetClass="entr" presetSubtype="0" fill="hold" grpId="0" nodeType="clickEffect">
+                                  <p:stCondLst>
+                                    <p:cond delay="0"/>
+                                  </p:stCondLst>
+                                  <p:childTnLst>
+                                    <p:set>
+                                      <p:cBhvr>
+                                        <p:cTn id="14" dur="1" fill="hold">
+                                          <p:stCondLst>
+                                            <p:cond delay="0"/>
+                                          </p:stCondLst>
+                                        </p:cTn>
+                                        <p:tgtEl>
+                                          <p:spTgt spid="9219">
+                                            <p:txEl>
+                                              <p:pRg st="0" end="0"/>
+                                            </p:txEl>
+                                          </p:spTgt>
+                                        </p:tgtEl>
+                                        <p:attrNameLst>
+                                          <p:attrName>style.visibility</p:attrName>
+                                        </p:attrNameLst>
+                                      </p:cBhvr>
+                                      <p:to>
+                                        <p:strVal val="visible"/>
+                                      </p:to>
+                                    </p:set>
+                                  </p:childTnLst>
+                                </p:cTn>
+                              </p:par>
+                              <p:par>
+                                <p:cTn id="15" presetID="1" presetClass="entr" presetSubtype="0" fill="hold" grpId="0" nodeType="withEffect">
+                                  <p:stCondLst>
+                                    <p:cond delay="0"/>
+                                  </p:stCondLst>
+                                  <p:childTnLst>
+                                    <p:set>
+                                      <p:cBhvr>
+                                        <p:cTn id="16" dur="1" fill="hold">
+                                          <p:stCondLst>
+                                            <p:cond delay="0"/>
+                                          </p:stCondLst>
+                                        </p:cTn>
+                                        <p:tgtEl>
+                                          <p:spTgt spid="9219">
+                                            <p:txEl>
+                                              <p:pRg st="2" end="2"/>
+                                            </p:txEl>
+                                          </p:spTgt>
+                                        </p:tgtEl>
+                                        <p:attrNameLst>
+                                          <p:attrName>style.visibility</p:attrName>
+                                        </p:attrNameLst>
+                                      </p:cBhvr>
+                                      <p:to>
+                                        <p:strVal val="visible"/>
+                                      </p:to>
+                                    </p:set>
+                                  </p:childTnLst>
+                                </p:cTn>
+                              </p:par>
+                              <p:par>
+                                <p:cTn id="17" presetID="1" presetClass="entr" presetSubtype="0" fill="hold" grpId="0" nodeType="withEffect">
+                                  <p:stCondLst>
+                                    <p:cond delay="0"/>
+                                  </p:stCondLst>
+                                  <p:childTnLst>
+                                    <p:set>
+                                      <p:cBhvr>
+                                        <p:cTn id="18" dur="1" fill="hold">
+                                          <p:stCondLst>
+                                            <p:cond delay="0"/>
+                                          </p:stCondLst>
+                                        </p:cTn>
+                                        <p:tgtEl>
+                                          <p:spTgt spid="9219">
+                                            <p:txEl>
+                                              <p:pRg st="3" end="3"/>
+                                            </p:txEl>
+                                          </p:spTgt>
+                                        </p:tgtEl>
+                                        <p:attrNameLst>
+                                          <p:attrName>style.visibility</p:attrName>
+                                        </p:attrNameLst>
+                                      </p:cBhvr>
+                                      <p:to>
+                                        <p:strVal val="visible"/>
+                                      </p:to>
+                                    </p:set>
+                                  </p:childTnLst>
+                                </p:cTn>
+                              </p:par>
+                            </p:childTnLst>
+                          </p:cTn>
+                        </p:par>
+                      </p:childTnLst>
+                    </p:cTn>
+                  </p:par>
                 </p:childTnLst>
               </p:cTn>
               <p:prevCondLst>
@@ -3334,6 +3447,7 @@
       </p:par>
     </p:tnLst>
     <p:bldLst>
+      <p:bldP spid="9219" grpId="0" uiExpand="1" build="p"/>
       <p:bldP spid="9222" grpId="0"/>
       <p:bldP spid="6" grpId="0"/>
     </p:bldLst>
@@ -3377,7 +3491,7 @@
           <a:p>
             <a:r>
               <a:rPr lang="en-US" sz="4000" dirty="0" smtClean="0"/>
-              <a:t>Solution &amp; Challenges</a:t>
+              <a:t>Conversion Challenges</a:t>
             </a:r>
             <a:endParaRPr lang="en-US" sz="4000" dirty="0" smtClean="0"/>
           </a:p>
@@ -3385,16 +3499,16 @@
       </p:sp>
       <p:sp>
         <p:nvSpPr>
-          <p:cNvPr id="10242" name="Rectangle 3"/>
-          <p:cNvSpPr>
-            <a:spLocks/>
+          <p:cNvPr id="38918" name="Text Box 6"/>
+          <p:cNvSpPr txBox="1">
+            <a:spLocks noChangeArrowheads="1"/>
           </p:cNvSpPr>
           <p:nvPr/>
         </p:nvSpPr>
         <p:spPr bwMode="auto">
           <a:xfrm>
-            <a:off x="266700" y="1052513"/>
-            <a:ext cx="8432800" cy="1538287"/>
+            <a:off x="279400" y="1095374"/>
+            <a:ext cx="8432800" cy="4431983"/>
           </a:xfrm>
           <a:prstGeom prst="rect">
             <a:avLst/>
@@ -3408,113 +3522,7 @@
           </a:ln>
         </p:spPr>
         <p:txBody>
-          <a:bodyPr/>
-          <a:lstStyle/>
-          <a:p>
-            <a:pPr marL="571500" indent="-571500" defTabSz="457200">
-              <a:lnSpc>
-                <a:spcPct val="90000"/>
-              </a:lnSpc>
-              <a:spcBef>
-                <a:spcPct val="20000"/>
-              </a:spcBef>
-              <a:buFont typeface="Arial" charset="0"/>
-              <a:buNone/>
-            </a:pPr>
-            <a:r>
-              <a:rPr lang="en-US" sz="2600" dirty="0" smtClean="0">
-                <a:latin typeface="Calibri" pitchFamily="34" charset="0"/>
-              </a:rPr>
-              <a:t>Solution:</a:t>
-            </a:r>
-            <a:r>
-              <a:rPr lang="en-US" sz="2600" b="0" dirty="0" smtClean="0">
-                <a:latin typeface="Calibri" pitchFamily="34" charset="0"/>
-              </a:rPr>
-              <a:t> </a:t>
-            </a:r>
-            <a:endParaRPr lang="en-US" sz="2600" b="0" dirty="0">
-              <a:latin typeface="Calibri" pitchFamily="34" charset="0"/>
-            </a:endParaRPr>
-          </a:p>
-          <a:p>
-            <a:pPr marL="571500" indent="-571500" defTabSz="457200">
-              <a:lnSpc>
-                <a:spcPct val="90000"/>
-              </a:lnSpc>
-              <a:spcBef>
-                <a:spcPct val="20000"/>
-              </a:spcBef>
-              <a:buFont typeface="Arial" charset="0"/>
-              <a:buNone/>
-            </a:pPr>
-            <a:endParaRPr lang="en-US" sz="1000" b="0" dirty="0">
-              <a:latin typeface="Calibri" pitchFamily="34" charset="0"/>
-            </a:endParaRPr>
-          </a:p>
-          <a:p>
-            <a:pPr marL="571500" indent="-571500" algn="ctr" defTabSz="457200">
-              <a:spcBef>
-                <a:spcPct val="20000"/>
-              </a:spcBef>
-            </a:pPr>
-            <a:r>
-              <a:rPr lang="en-US" sz="2400" b="0" dirty="0">
-                <a:latin typeface="Calibri" pitchFamily="34" charset="0"/>
-              </a:rPr>
-              <a:t>Integrate all of a user’s calendars into a single web</a:t>
-            </a:r>
-          </a:p>
-          <a:p>
-            <a:pPr marL="571500" indent="-571500" algn="ctr" defTabSz="457200">
-              <a:spcBef>
-                <a:spcPct val="20000"/>
-              </a:spcBef>
-            </a:pPr>
-            <a:r>
-              <a:rPr lang="en-US" sz="2400" b="0" dirty="0">
-                <a:latin typeface="Calibri" pitchFamily="34" charset="0"/>
-              </a:rPr>
-              <a:t>interface and juxtapose it with the user’s to-do </a:t>
-            </a:r>
-            <a:r>
-              <a:rPr lang="en-US" sz="2400" b="0" dirty="0" smtClean="0">
-                <a:latin typeface="Calibri" pitchFamily="34" charset="0"/>
-              </a:rPr>
-              <a:t>list</a:t>
-            </a:r>
-            <a:endParaRPr lang="en-US" sz="2200" b="0" dirty="0">
-              <a:latin typeface="Calibri" pitchFamily="34" charset="0"/>
-            </a:endParaRPr>
-          </a:p>
-        </p:txBody>
-      </p:sp>
-      <p:sp>
-        <p:nvSpPr>
-          <p:cNvPr id="38918" name="Text Box 6"/>
-          <p:cNvSpPr txBox="1">
-            <a:spLocks noChangeArrowheads="1"/>
-          </p:cNvSpPr>
-          <p:nvPr/>
-        </p:nvSpPr>
-        <p:spPr bwMode="auto">
-          <a:xfrm>
-            <a:off x="279400" y="2895600"/>
-            <a:ext cx="8432800" cy="3200876"/>
-          </a:xfrm>
-          <a:prstGeom prst="rect">
-            <a:avLst/>
-          </a:prstGeom>
-          <a:noFill/>
-          <a:ln w="9525">
-            <a:noFill/>
-            <a:miter lim="800000"/>
-            <a:headEnd/>
-            <a:tailEnd/>
-          </a:ln>
-        </p:spPr>
-        <p:txBody>
-          <a:bodyPr>
+          <a:bodyPr wrap="square">
             <a:spAutoFit/>
           </a:bodyPr>
           <a:lstStyle/>
@@ -3560,7 +3568,13 @@
               <a:rPr lang="en-US" sz="2000" b="0" dirty="0" smtClean="0">
                 <a:latin typeface="Calibri" pitchFamily="34" charset="0"/>
               </a:rPr>
-              <a:t>The user should enjoy the mobile experience at least as much as their online one.</a:t>
+              <a:t>The user should enjoy the mobile experience at least as much as their online one</a:t>
+            </a:r>
+            <a:r>
+              <a:rPr lang="en-US" sz="2000" b="0" dirty="0" smtClean="0">
+                <a:latin typeface="Calibri" pitchFamily="34" charset="0"/>
+              </a:rPr>
+              <a:t>.</a:t>
             </a:r>
           </a:p>
           <a:p>
@@ -3572,7 +3586,28 @@
               <a:rPr lang="en-US" sz="2000" b="0" dirty="0" smtClean="0">
                 <a:latin typeface="Calibri" pitchFamily="34" charset="0"/>
               </a:rPr>
-              <a:t>Leverage mobile specific capabilities (e.g. gestures</a:t>
+              <a:t>Users hate to relearn.  Allow for the frequency of practice on one platform to map well to the other.</a:t>
+            </a:r>
+            <a:endParaRPr lang="en-US" sz="2000" b="0" dirty="0" smtClean="0">
+              <a:latin typeface="Calibri" pitchFamily="34" charset="0"/>
+            </a:endParaRPr>
+          </a:p>
+          <a:p>
+            <a:pPr marL="914400" lvl="1" indent="-457200">
+              <a:buFontTx/>
+              <a:buChar char="•"/>
+            </a:pPr>
+            <a:r>
+              <a:rPr lang="en-US" sz="2000" b="0" dirty="0" smtClean="0">
+                <a:latin typeface="Calibri" pitchFamily="34" charset="0"/>
+              </a:rPr>
+              <a:t>Design should leverage </a:t>
+            </a:r>
+            <a:r>
+              <a:rPr lang="en-US" sz="2000" b="0" dirty="0" smtClean="0">
+                <a:latin typeface="Calibri" pitchFamily="34" charset="0"/>
+              </a:rPr>
+              <a:t>mobile specific capabilities (e.g. gestures</a:t>
             </a:r>
             <a:r>
               <a:rPr lang="en-US" sz="2000" b="0" dirty="0" smtClean="0">
@@ -3613,6 +3648,33 @@
               </a:rPr>
               <a:t>Users should be able to quickly link the two platforms in their minds.</a:t>
             </a:r>
+          </a:p>
+          <a:p>
+            <a:pPr marL="914400" lvl="1" indent="-457200">
+              <a:buFontTx/>
+              <a:buChar char="•"/>
+            </a:pPr>
+            <a:r>
+              <a:rPr lang="en-US" sz="2000" b="0" dirty="0" smtClean="0">
+                <a:latin typeface="Calibri" pitchFamily="34" charset="0"/>
+              </a:rPr>
+              <a:t>“</a:t>
+            </a:r>
+            <a:r>
+              <a:rPr lang="en-US" sz="2000" b="0" i="1" dirty="0" smtClean="0">
+                <a:latin typeface="Calibri" pitchFamily="34" charset="0"/>
+              </a:rPr>
+              <a:t>The three key rules of marketing are: brand recognition, brand recognition, and brand recognition</a:t>
+            </a:r>
+            <a:r>
+              <a:rPr lang="en-US" sz="2000" b="0" dirty="0" smtClean="0">
+                <a:latin typeface="Calibri" pitchFamily="34" charset="0"/>
+              </a:rPr>
+              <a:t>.”</a:t>
+            </a:r>
+            <a:endParaRPr lang="en-US" sz="2000" b="0" dirty="0" smtClean="0">
+              <a:latin typeface="Calibri" pitchFamily="34" charset="0"/>
+            </a:endParaRPr>
           </a:p>
         </p:txBody>
       </p:sp>
@@ -3655,7 +3717,269 @@
                                           </p:stCondLst>
                                         </p:cTn>
                                         <p:tgtEl>
-                                          <p:spTgt spid="38918"/>
+                                          <p:spTgt spid="38918">
+                                            <p:txEl>
+                                              <p:pRg st="2" end="2"/>
+                                            </p:txEl>
+                                          </p:spTgt>
+                                        </p:tgtEl>
+                                        <p:attrNameLst>
+                                          <p:attrName>style.visibility</p:attrName>
+                                        </p:attrNameLst>
+                                      </p:cBhvr>
+                                      <p:to>
+                                        <p:strVal val="visible"/>
+                                      </p:to>
+                                    </p:set>
+                                  </p:childTnLst>
+                                </p:cTn>
+                              </p:par>
+                            </p:childTnLst>
+                          </p:cTn>
+                        </p:par>
+                      </p:childTnLst>
+                    </p:cTn>
+                  </p:par>
+                  <p:par>
+                    <p:cTn id="7" fill="hold">
+                      <p:stCondLst>
+                        <p:cond delay="indefinite"/>
+                      </p:stCondLst>
+                      <p:childTnLst>
+                        <p:par>
+                          <p:cTn id="8" fill="hold">
+                            <p:stCondLst>
+                              <p:cond delay="0"/>
+                            </p:stCondLst>
+                            <p:childTnLst>
+                              <p:par>
+                                <p:cTn id="9" presetID="1" presetClass="entr" presetSubtype="0" fill="hold" grpId="0" nodeType="clickEffect">
+                                  <p:stCondLst>
+                                    <p:cond delay="0"/>
+                                  </p:stCondLst>
+                                  <p:childTnLst>
+                                    <p:set>
+                                      <p:cBhvr>
+                                        <p:cTn id="10" dur="1" fill="hold">
+                                          <p:stCondLst>
+                                            <p:cond delay="0"/>
+                                          </p:stCondLst>
+                                        </p:cTn>
+                                        <p:tgtEl>
+                                          <p:spTgt spid="38918">
+                                            <p:txEl>
+                                              <p:pRg st="3" end="3"/>
+                                            </p:txEl>
+                                          </p:spTgt>
+                                        </p:tgtEl>
+                                        <p:attrNameLst>
+                                          <p:attrName>style.visibility</p:attrName>
+                                        </p:attrNameLst>
+                                      </p:cBhvr>
+                                      <p:to>
+                                        <p:strVal val="visible"/>
+                                      </p:to>
+                                    </p:set>
+                                  </p:childTnLst>
+                                </p:cTn>
+                              </p:par>
+                            </p:childTnLst>
+                          </p:cTn>
+                        </p:par>
+                      </p:childTnLst>
+                    </p:cTn>
+                  </p:par>
+                  <p:par>
+                    <p:cTn id="11" fill="hold">
+                      <p:stCondLst>
+                        <p:cond delay="indefinite"/>
+                      </p:stCondLst>
+                      <p:childTnLst>
+                        <p:par>
+                          <p:cTn id="12" fill="hold">
+                            <p:stCondLst>
+                              <p:cond delay="0"/>
+                            </p:stCondLst>
+                            <p:childTnLst>
+                              <p:par>
+                                <p:cTn id="13" presetID="1" presetClass="entr" presetSubtype="0" fill="hold" grpId="0" nodeType="clickEffect">
+                                  <p:stCondLst>
+                                    <p:cond delay="0"/>
+                                  </p:stCondLst>
+                                  <p:childTnLst>
+                                    <p:set>
+                                      <p:cBhvr>
+                                        <p:cTn id="14" dur="1" fill="hold">
+                                          <p:stCondLst>
+                                            <p:cond delay="0"/>
+                                          </p:stCondLst>
+                                        </p:cTn>
+                                        <p:tgtEl>
+                                          <p:spTgt spid="38918">
+                                            <p:txEl>
+                                              <p:pRg st="4" end="4"/>
+                                            </p:txEl>
+                                          </p:spTgt>
+                                        </p:tgtEl>
+                                        <p:attrNameLst>
+                                          <p:attrName>style.visibility</p:attrName>
+                                        </p:attrNameLst>
+                                      </p:cBhvr>
+                                      <p:to>
+                                        <p:strVal val="visible"/>
+                                      </p:to>
+                                    </p:set>
+                                  </p:childTnLst>
+                                </p:cTn>
+                              </p:par>
+                            </p:childTnLst>
+                          </p:cTn>
+                        </p:par>
+                      </p:childTnLst>
+                    </p:cTn>
+                  </p:par>
+                  <p:par>
+                    <p:cTn id="15" fill="hold">
+                      <p:stCondLst>
+                        <p:cond delay="indefinite"/>
+                      </p:stCondLst>
+                      <p:childTnLst>
+                        <p:par>
+                          <p:cTn id="16" fill="hold">
+                            <p:stCondLst>
+                              <p:cond delay="0"/>
+                            </p:stCondLst>
+                            <p:childTnLst>
+                              <p:par>
+                                <p:cTn id="17" presetID="1" presetClass="entr" presetSubtype="0" fill="hold" grpId="0" nodeType="clickEffect">
+                                  <p:stCondLst>
+                                    <p:cond delay="0"/>
+                                  </p:stCondLst>
+                                  <p:childTnLst>
+                                    <p:set>
+                                      <p:cBhvr>
+                                        <p:cTn id="18" dur="1" fill="hold">
+                                          <p:stCondLst>
+                                            <p:cond delay="0"/>
+                                          </p:stCondLst>
+                                        </p:cTn>
+                                        <p:tgtEl>
+                                          <p:spTgt spid="38918">
+                                            <p:txEl>
+                                              <p:pRg st="5" end="5"/>
+                                            </p:txEl>
+                                          </p:spTgt>
+                                        </p:tgtEl>
+                                        <p:attrNameLst>
+                                          <p:attrName>style.visibility</p:attrName>
+                                        </p:attrNameLst>
+                                      </p:cBhvr>
+                                      <p:to>
+                                        <p:strVal val="visible"/>
+                                      </p:to>
+                                    </p:set>
+                                  </p:childTnLst>
+                                </p:cTn>
+                              </p:par>
+                            </p:childTnLst>
+                          </p:cTn>
+                        </p:par>
+                      </p:childTnLst>
+                    </p:cTn>
+                  </p:par>
+                  <p:par>
+                    <p:cTn id="19" fill="hold">
+                      <p:stCondLst>
+                        <p:cond delay="indefinite"/>
+                      </p:stCondLst>
+                      <p:childTnLst>
+                        <p:par>
+                          <p:cTn id="20" fill="hold">
+                            <p:stCondLst>
+                              <p:cond delay="0"/>
+                            </p:stCondLst>
+                            <p:childTnLst>
+                              <p:par>
+                                <p:cTn id="21" presetID="1" presetClass="entr" presetSubtype="0" fill="hold" grpId="0" nodeType="clickEffect">
+                                  <p:stCondLst>
+                                    <p:cond delay="0"/>
+                                  </p:stCondLst>
+                                  <p:childTnLst>
+                                    <p:set>
+                                      <p:cBhvr>
+                                        <p:cTn id="22" dur="1" fill="hold">
+                                          <p:stCondLst>
+                                            <p:cond delay="0"/>
+                                          </p:stCondLst>
+                                        </p:cTn>
+                                        <p:tgtEl>
+                                          <p:spTgt spid="38918">
+                                            <p:txEl>
+                                              <p:pRg st="7" end="7"/>
+                                            </p:txEl>
+                                          </p:spTgt>
+                                        </p:tgtEl>
+                                        <p:attrNameLst>
+                                          <p:attrName>style.visibility</p:attrName>
+                                        </p:attrNameLst>
+                                      </p:cBhvr>
+                                      <p:to>
+                                        <p:strVal val="visible"/>
+                                      </p:to>
+                                    </p:set>
+                                  </p:childTnLst>
+                                </p:cTn>
+                              </p:par>
+                              <p:par>
+                                <p:cTn id="23" presetID="1" presetClass="entr" presetSubtype="0" fill="hold" grpId="0" nodeType="withEffect">
+                                  <p:stCondLst>
+                                    <p:cond delay="0"/>
+                                  </p:stCondLst>
+                                  <p:childTnLst>
+                                    <p:set>
+                                      <p:cBhvr>
+                                        <p:cTn id="24" dur="1" fill="hold">
+                                          <p:stCondLst>
+                                            <p:cond delay="0"/>
+                                          </p:stCondLst>
+                                        </p:cTn>
+                                        <p:tgtEl>
+                                          <p:spTgt spid="38918">
+                                            <p:txEl>
+                                              <p:pRg st="8" end="8"/>
+                                            </p:txEl>
+                                          </p:spTgt>
+                                        </p:tgtEl>
+                                        <p:attrNameLst>
+                                          <p:attrName>style.visibility</p:attrName>
+                                        </p:attrNameLst>
+                                      </p:cBhvr>
+                                      <p:to>
+                                        <p:strVal val="visible"/>
+                                      </p:to>
+                                    </p:set>
+                                  </p:childTnLst>
+                                </p:cTn>
+                              </p:par>
+                              <p:par>
+                                <p:cTn id="25" presetID="1" presetClass="entr" presetSubtype="0" fill="hold" grpId="0" nodeType="withEffect">
+                                  <p:stCondLst>
+                                    <p:cond delay="0"/>
+                                  </p:stCondLst>
+                                  <p:childTnLst>
+                                    <p:set>
+                                      <p:cBhvr>
+                                        <p:cTn id="26" dur="1" fill="hold">
+                                          <p:stCondLst>
+                                            <p:cond delay="0"/>
+                                          </p:stCondLst>
+                                        </p:cTn>
+                                        <p:tgtEl>
+                                          <p:spTgt spid="38918">
+                                            <p:txEl>
+                                              <p:pRg st="9" end="9"/>
+                                            </p:txEl>
+                                          </p:spTgt>
                                         </p:tgtEl>
                                         <p:attrNameLst>
                                           <p:attrName>style.visibility</p:attrName>
@@ -3696,7 +4020,7 @@
       </p:par>
     </p:tnLst>
     <p:bldLst>
-      <p:bldP spid="38918" grpId="0"/>
+      <p:bldP spid="38918" grpId="0" uiExpand="1" build="allAtOnce"/>
     </p:bldLst>
   </p:timing>
 </p:sld>
@@ -3809,8 +4133,29 @@
                   <a:srgbClr val="003300"/>
                 </a:solidFill>
               </a:rPr>
-              <a:t>Concept presented by guest lecturer Robert Nicholson</a:t>
-            </a:r>
+              <a:t>Concept </a:t>
+            </a:r>
+            <a:r>
+              <a:rPr lang="en-US" sz="1800" dirty="0" smtClean="0">
+                <a:solidFill>
+                  <a:srgbClr val="003300"/>
+                </a:solidFill>
+              </a:rPr>
+              <a:t>presented by guest lecturer Robert </a:t>
+            </a:r>
+            <a:r>
+              <a:rPr lang="en-US" sz="1800" dirty="0" smtClean="0">
+                <a:solidFill>
+                  <a:srgbClr val="003300"/>
+                </a:solidFill>
+              </a:rPr>
+              <a:t>Nicholson</a:t>
+            </a:r>
+            <a:endParaRPr lang="en-US" sz="1800" dirty="0" smtClean="0">
+              <a:solidFill>
+                <a:srgbClr val="003300"/>
+              </a:solidFill>
+            </a:endParaRPr>
           </a:p>
           <a:p>
             <a:pPr lvl="1"/>
@@ -4106,8 +4451,21 @@
                   <a:srgbClr val="003300"/>
                 </a:solidFill>
               </a:rPr>
-              <a:t>Mobile friendly</a:t>
-            </a:r>
+              <a:t>Mobile </a:t>
+            </a:r>
+            <a:r>
+              <a:rPr lang="en-US" sz="1800" dirty="0" smtClean="0">
+                <a:solidFill>
+                  <a:srgbClr val="003300"/>
+                </a:solidFill>
+              </a:rPr>
+              <a:t>friendly, minimally intrusive, yet obviously apparent</a:t>
+            </a:r>
+            <a:endParaRPr lang="en-US" sz="1800" dirty="0" smtClean="0">
+              <a:solidFill>
+                <a:srgbClr val="003300"/>
+              </a:solidFill>
+            </a:endParaRPr>
           </a:p>
           <a:p>
             <a:pPr lvl="1"/>

</xml_diff>